<commit_message>
KBLFRM-1208: Defined Coordinate System for Terminals and added WireReception.Rotation
</commit_message>
<xml_diff>
--- a/vec/models/drawings.pptx
+++ b/vec/models/drawings.pptx
@@ -7,6 +7,7 @@
   <p:sldIdLst>
     <p:sldId id="256" r:id="rId2"/>
     <p:sldId id="260" r:id="rId3"/>
+    <p:sldId id="261" r:id="rId4"/>
   </p:sldIdLst>
   <p:sldSz cx="12192000" cy="6858000"/>
   <p:notesSz cx="6858000" cy="9144000"/>
@@ -6715,6 +6716,2482 @@
 </p:sld>
 </file>
 
+<file path=ppt/slides/slide3.xml><?xml version="1.0" encoding="utf-8"?>
+<p:sld xmlns:a="http://schemas.openxmlformats.org/drawingml/2006/main" xmlns:r="http://schemas.openxmlformats.org/officeDocument/2006/relationships" xmlns:p="http://schemas.openxmlformats.org/presentationml/2006/main">
+  <p:cSld>
+    <p:spTree>
+      <p:nvGrpSpPr>
+        <p:cNvPr id="1" name=""/>
+        <p:cNvGrpSpPr/>
+        <p:nvPr/>
+      </p:nvGrpSpPr>
+      <p:grpSpPr>
+        <a:xfrm>
+          <a:off x="0" y="0"/>
+          <a:ext cx="0" cy="0"/>
+          <a:chOff x="0" y="0"/>
+          <a:chExt cx="0" cy="0"/>
+        </a:xfrm>
+      </p:grpSpPr>
+      <p:grpSp>
+        <p:nvGrpSpPr>
+          <p:cNvPr id="106" name="Gruppieren 105">
+            <a:extLst>
+              <a:ext uri="{FF2B5EF4-FFF2-40B4-BE49-F238E27FC236}">
+                <a16:creationId xmlns:a16="http://schemas.microsoft.com/office/drawing/2014/main" id="{D7891EA5-3032-9B90-6B13-F9D5C1C15885}"/>
+              </a:ext>
+            </a:extLst>
+          </p:cNvPr>
+          <p:cNvGrpSpPr/>
+          <p:nvPr/>
+        </p:nvGrpSpPr>
+        <p:grpSpPr>
+          <a:xfrm>
+            <a:off x="1577498" y="2692869"/>
+            <a:ext cx="4551656" cy="2980929"/>
+            <a:chOff x="1577498" y="1528886"/>
+            <a:chExt cx="4551656" cy="2980929"/>
+          </a:xfrm>
+        </p:grpSpPr>
+        <p:sp>
+          <p:nvSpPr>
+            <p:cNvPr id="4" name="Rechteck 3">
+              <a:extLst>
+                <a:ext uri="{FF2B5EF4-FFF2-40B4-BE49-F238E27FC236}">
+                  <a16:creationId xmlns:a16="http://schemas.microsoft.com/office/drawing/2014/main" id="{66A9FD86-6541-8B9B-853A-8E8CB85F444C}"/>
+                </a:ext>
+              </a:extLst>
+            </p:cNvPr>
+            <p:cNvSpPr/>
+            <p:nvPr/>
+          </p:nvSpPr>
+          <p:spPr>
+            <a:xfrm>
+              <a:off x="2202625" y="2973280"/>
+              <a:ext cx="3926529" cy="461247"/>
+            </a:xfrm>
+            <a:prstGeom prst="rect">
+              <a:avLst/>
+            </a:prstGeom>
+            <a:solidFill>
+              <a:schemeClr val="bg2">
+                <a:lumMod val="75000"/>
+              </a:schemeClr>
+            </a:solidFill>
+            <a:scene3d>
+              <a:camera prst="isometricTopUp"/>
+              <a:lightRig rig="threePt" dir="t"/>
+            </a:scene3d>
+          </p:spPr>
+          <p:style>
+            <a:lnRef idx="2">
+              <a:schemeClr val="accent1">
+                <a:shade val="15000"/>
+              </a:schemeClr>
+            </a:lnRef>
+            <a:fillRef idx="1">
+              <a:schemeClr val="accent1"/>
+            </a:fillRef>
+            <a:effectRef idx="0">
+              <a:schemeClr val="accent1"/>
+            </a:effectRef>
+            <a:fontRef idx="minor">
+              <a:schemeClr val="lt1"/>
+            </a:fontRef>
+          </p:style>
+          <p:txBody>
+            <a:bodyPr rtlCol="0" anchor="ctr"/>
+            <a:lstStyle/>
+            <a:p>
+              <a:pPr algn="ctr"/>
+              <a:endParaRPr lang="de-DE"/>
+            </a:p>
+          </p:txBody>
+        </p:sp>
+        <p:sp>
+          <p:nvSpPr>
+            <p:cNvPr id="5" name="Rechteck 4">
+              <a:extLst>
+                <a:ext uri="{FF2B5EF4-FFF2-40B4-BE49-F238E27FC236}">
+                  <a16:creationId xmlns:a16="http://schemas.microsoft.com/office/drawing/2014/main" id="{A24D98D2-12AB-50BA-6CBE-E1006BCB27BE}"/>
+                </a:ext>
+              </a:extLst>
+            </p:cNvPr>
+            <p:cNvSpPr/>
+            <p:nvPr/>
+          </p:nvSpPr>
+          <p:spPr>
+            <a:xfrm>
+              <a:off x="2555088" y="3583545"/>
+              <a:ext cx="453328" cy="461247"/>
+            </a:xfrm>
+            <a:prstGeom prst="rect">
+              <a:avLst/>
+            </a:prstGeom>
+            <a:solidFill>
+              <a:schemeClr val="bg2">
+                <a:lumMod val="75000"/>
+              </a:schemeClr>
+            </a:solidFill>
+            <a:scene3d>
+              <a:camera prst="isometricLeftDown"/>
+              <a:lightRig rig="threePt" dir="t"/>
+            </a:scene3d>
+          </p:spPr>
+          <p:style>
+            <a:lnRef idx="2">
+              <a:schemeClr val="accent1">
+                <a:shade val="15000"/>
+              </a:schemeClr>
+            </a:lnRef>
+            <a:fillRef idx="1">
+              <a:schemeClr val="accent1"/>
+            </a:fillRef>
+            <a:effectRef idx="0">
+              <a:schemeClr val="accent1"/>
+            </a:effectRef>
+            <a:fontRef idx="minor">
+              <a:schemeClr val="lt1"/>
+            </a:fontRef>
+          </p:style>
+          <p:txBody>
+            <a:bodyPr rtlCol="0" anchor="ctr"/>
+            <a:lstStyle/>
+            <a:p>
+              <a:pPr algn="ctr"/>
+              <a:endParaRPr lang="de-DE"/>
+            </a:p>
+          </p:txBody>
+        </p:sp>
+        <p:sp>
+          <p:nvSpPr>
+            <p:cNvPr id="7" name="Rechteck 6">
+              <a:extLst>
+                <a:ext uri="{FF2B5EF4-FFF2-40B4-BE49-F238E27FC236}">
+                  <a16:creationId xmlns:a16="http://schemas.microsoft.com/office/drawing/2014/main" id="{2629B4B5-3083-D085-74CE-9C1BBD3D58EB}"/>
+                </a:ext>
+              </a:extLst>
+            </p:cNvPr>
+            <p:cNvSpPr/>
+            <p:nvPr/>
+          </p:nvSpPr>
+          <p:spPr>
+            <a:xfrm>
+              <a:off x="2541564" y="3047789"/>
+              <a:ext cx="1713760" cy="461247"/>
+            </a:xfrm>
+            <a:prstGeom prst="rect">
+              <a:avLst/>
+            </a:prstGeom>
+            <a:solidFill>
+              <a:schemeClr val="bg2">
+                <a:lumMod val="75000"/>
+              </a:schemeClr>
+            </a:solidFill>
+            <a:scene3d>
+              <a:camera prst="isometricTopUp"/>
+              <a:lightRig rig="threePt" dir="t"/>
+            </a:scene3d>
+          </p:spPr>
+          <p:style>
+            <a:lnRef idx="2">
+              <a:schemeClr val="accent1">
+                <a:shade val="15000"/>
+              </a:schemeClr>
+            </a:lnRef>
+            <a:fillRef idx="1">
+              <a:schemeClr val="accent1"/>
+            </a:fillRef>
+            <a:effectRef idx="0">
+              <a:schemeClr val="accent1"/>
+            </a:effectRef>
+            <a:fontRef idx="minor">
+              <a:schemeClr val="lt1"/>
+            </a:fontRef>
+          </p:style>
+          <p:txBody>
+            <a:bodyPr rtlCol="0" anchor="ctr"/>
+            <a:lstStyle/>
+            <a:p>
+              <a:pPr algn="ctr"/>
+              <a:endParaRPr lang="de-DE"/>
+            </a:p>
+          </p:txBody>
+        </p:sp>
+        <p:sp>
+          <p:nvSpPr>
+            <p:cNvPr id="22" name="Rechteck 21">
+              <a:extLst>
+                <a:ext uri="{FF2B5EF4-FFF2-40B4-BE49-F238E27FC236}">
+                  <a16:creationId xmlns:a16="http://schemas.microsoft.com/office/drawing/2014/main" id="{F1379003-C3D3-4F12-2AA3-F0ED2B6BE534}"/>
+                </a:ext>
+              </a:extLst>
+            </p:cNvPr>
+            <p:cNvSpPr/>
+            <p:nvPr/>
+          </p:nvSpPr>
+          <p:spPr>
+            <a:xfrm>
+              <a:off x="2697924" y="3327541"/>
+              <a:ext cx="1713760" cy="461247"/>
+            </a:xfrm>
+            <a:prstGeom prst="rect">
+              <a:avLst/>
+            </a:prstGeom>
+            <a:solidFill>
+              <a:schemeClr val="bg2">
+                <a:lumMod val="75000"/>
+              </a:schemeClr>
+            </a:solidFill>
+            <a:scene3d>
+              <a:camera prst="isometricRightUp"/>
+              <a:lightRig rig="threePt" dir="t"/>
+            </a:scene3d>
+          </p:spPr>
+          <p:style>
+            <a:lnRef idx="2">
+              <a:schemeClr val="accent1">
+                <a:shade val="15000"/>
+              </a:schemeClr>
+            </a:lnRef>
+            <a:fillRef idx="1">
+              <a:schemeClr val="accent1"/>
+            </a:fillRef>
+            <a:effectRef idx="0">
+              <a:schemeClr val="accent1"/>
+            </a:effectRef>
+            <a:fontRef idx="minor">
+              <a:schemeClr val="lt1"/>
+            </a:fontRef>
+          </p:style>
+          <p:txBody>
+            <a:bodyPr rtlCol="0" anchor="ctr"/>
+            <a:lstStyle/>
+            <a:p>
+              <a:pPr algn="ctr"/>
+              <a:endParaRPr lang="de-DE"/>
+            </a:p>
+          </p:txBody>
+        </p:sp>
+        <p:sp>
+          <p:nvSpPr>
+            <p:cNvPr id="24" name="Rechteck 23">
+              <a:extLst>
+                <a:ext uri="{FF2B5EF4-FFF2-40B4-BE49-F238E27FC236}">
+                  <a16:creationId xmlns:a16="http://schemas.microsoft.com/office/drawing/2014/main" id="{E2BA5868-A611-7A91-E96A-542AE0F42071}"/>
+                </a:ext>
+              </a:extLst>
+            </p:cNvPr>
+            <p:cNvSpPr/>
+            <p:nvPr/>
+          </p:nvSpPr>
+          <p:spPr>
+            <a:xfrm>
+              <a:off x="4866906" y="1925131"/>
+              <a:ext cx="245426" cy="686456"/>
+            </a:xfrm>
+            <a:prstGeom prst="rect">
+              <a:avLst/>
+            </a:prstGeom>
+            <a:solidFill>
+              <a:schemeClr val="bg2">
+                <a:lumMod val="75000"/>
+              </a:schemeClr>
+            </a:solidFill>
+            <a:scene3d>
+              <a:camera prst="isometricRightUp"/>
+              <a:lightRig rig="threePt" dir="t"/>
+            </a:scene3d>
+          </p:spPr>
+          <p:style>
+            <a:lnRef idx="2">
+              <a:schemeClr val="accent1">
+                <a:shade val="15000"/>
+              </a:schemeClr>
+            </a:lnRef>
+            <a:fillRef idx="1">
+              <a:schemeClr val="accent1"/>
+            </a:fillRef>
+            <a:effectRef idx="0">
+              <a:schemeClr val="accent1"/>
+            </a:effectRef>
+            <a:fontRef idx="minor">
+              <a:schemeClr val="lt1"/>
+            </a:fontRef>
+          </p:style>
+          <p:txBody>
+            <a:bodyPr rtlCol="0" anchor="ctr"/>
+            <a:lstStyle/>
+            <a:p>
+              <a:pPr algn="ctr"/>
+              <a:endParaRPr lang="de-DE"/>
+            </a:p>
+          </p:txBody>
+        </p:sp>
+        <p:sp>
+          <p:nvSpPr>
+            <p:cNvPr id="23" name="Rechteck 22">
+              <a:extLst>
+                <a:ext uri="{FF2B5EF4-FFF2-40B4-BE49-F238E27FC236}">
+                  <a16:creationId xmlns:a16="http://schemas.microsoft.com/office/drawing/2014/main" id="{8F8A7F89-B836-7367-885F-F1BA32D15643}"/>
+                </a:ext>
+              </a:extLst>
+            </p:cNvPr>
+            <p:cNvSpPr/>
+            <p:nvPr/>
+          </p:nvSpPr>
+          <p:spPr>
+            <a:xfrm>
+              <a:off x="5191992" y="2109900"/>
+              <a:ext cx="245426" cy="686456"/>
+            </a:xfrm>
+            <a:prstGeom prst="rect">
+              <a:avLst/>
+            </a:prstGeom>
+            <a:solidFill>
+              <a:schemeClr val="bg2">
+                <a:lumMod val="75000"/>
+              </a:schemeClr>
+            </a:solidFill>
+            <a:scene3d>
+              <a:camera prst="isometricRightUp"/>
+              <a:lightRig rig="threePt" dir="t"/>
+            </a:scene3d>
+          </p:spPr>
+          <p:style>
+            <a:lnRef idx="2">
+              <a:schemeClr val="accent1">
+                <a:shade val="15000"/>
+              </a:schemeClr>
+            </a:lnRef>
+            <a:fillRef idx="1">
+              <a:schemeClr val="accent1"/>
+            </a:fillRef>
+            <a:effectRef idx="0">
+              <a:schemeClr val="accent1"/>
+            </a:effectRef>
+            <a:fontRef idx="minor">
+              <a:schemeClr val="lt1"/>
+            </a:fontRef>
+          </p:style>
+          <p:txBody>
+            <a:bodyPr rtlCol="0" anchor="ctr"/>
+            <a:lstStyle/>
+            <a:p>
+              <a:pPr algn="ctr"/>
+              <a:endParaRPr lang="de-DE"/>
+            </a:p>
+          </p:txBody>
+        </p:sp>
+        <p:sp>
+          <p:nvSpPr>
+            <p:cNvPr id="25" name="Rechteck 24">
+              <a:extLst>
+                <a:ext uri="{FF2B5EF4-FFF2-40B4-BE49-F238E27FC236}">
+                  <a16:creationId xmlns:a16="http://schemas.microsoft.com/office/drawing/2014/main" id="{CFC1B66C-4B0D-752B-1D53-DACF69A57C15}"/>
+                </a:ext>
+              </a:extLst>
+            </p:cNvPr>
+            <p:cNvSpPr/>
+            <p:nvPr/>
+          </p:nvSpPr>
+          <p:spPr>
+            <a:xfrm>
+              <a:off x="4312237" y="2236561"/>
+              <a:ext cx="245426" cy="686456"/>
+            </a:xfrm>
+            <a:prstGeom prst="rect">
+              <a:avLst/>
+            </a:prstGeom>
+            <a:solidFill>
+              <a:schemeClr val="bg2">
+                <a:lumMod val="75000"/>
+              </a:schemeClr>
+            </a:solidFill>
+            <a:scene3d>
+              <a:camera prst="isometricRightUp"/>
+              <a:lightRig rig="threePt" dir="t"/>
+            </a:scene3d>
+          </p:spPr>
+          <p:style>
+            <a:lnRef idx="2">
+              <a:schemeClr val="accent1">
+                <a:shade val="15000"/>
+              </a:schemeClr>
+            </a:lnRef>
+            <a:fillRef idx="1">
+              <a:schemeClr val="accent1"/>
+            </a:fillRef>
+            <a:effectRef idx="0">
+              <a:schemeClr val="accent1"/>
+            </a:effectRef>
+            <a:fontRef idx="minor">
+              <a:schemeClr val="lt1"/>
+            </a:fontRef>
+          </p:style>
+          <p:txBody>
+            <a:bodyPr rtlCol="0" anchor="ctr"/>
+            <a:lstStyle/>
+            <a:p>
+              <a:pPr algn="ctr"/>
+              <a:endParaRPr lang="de-DE"/>
+            </a:p>
+          </p:txBody>
+        </p:sp>
+        <p:sp>
+          <p:nvSpPr>
+            <p:cNvPr id="26" name="Rechteck 25">
+              <a:extLst>
+                <a:ext uri="{FF2B5EF4-FFF2-40B4-BE49-F238E27FC236}">
+                  <a16:creationId xmlns:a16="http://schemas.microsoft.com/office/drawing/2014/main" id="{A8ABE704-8C01-CE61-B593-A75727FADF08}"/>
+                </a:ext>
+              </a:extLst>
+            </p:cNvPr>
+            <p:cNvSpPr/>
+            <p:nvPr/>
+          </p:nvSpPr>
+          <p:spPr>
+            <a:xfrm>
+              <a:off x="4637323" y="2421330"/>
+              <a:ext cx="245426" cy="686456"/>
+            </a:xfrm>
+            <a:prstGeom prst="rect">
+              <a:avLst/>
+            </a:prstGeom>
+            <a:solidFill>
+              <a:schemeClr val="bg2">
+                <a:lumMod val="75000"/>
+              </a:schemeClr>
+            </a:solidFill>
+            <a:scene3d>
+              <a:camera prst="isometricRightUp"/>
+              <a:lightRig rig="threePt" dir="t"/>
+            </a:scene3d>
+          </p:spPr>
+          <p:style>
+            <a:lnRef idx="2">
+              <a:schemeClr val="accent1">
+                <a:shade val="15000"/>
+              </a:schemeClr>
+            </a:lnRef>
+            <a:fillRef idx="1">
+              <a:schemeClr val="accent1"/>
+            </a:fillRef>
+            <a:effectRef idx="0">
+              <a:schemeClr val="accent1"/>
+            </a:effectRef>
+            <a:fontRef idx="minor">
+              <a:schemeClr val="lt1"/>
+            </a:fontRef>
+          </p:style>
+          <p:txBody>
+            <a:bodyPr rtlCol="0" anchor="ctr"/>
+            <a:lstStyle/>
+            <a:p>
+              <a:pPr algn="ctr"/>
+              <a:endParaRPr lang="de-DE"/>
+            </a:p>
+          </p:txBody>
+        </p:sp>
+        <p:sp>
+          <p:nvSpPr>
+            <p:cNvPr id="31" name="Freihandform: Form 30">
+              <a:extLst>
+                <a:ext uri="{FF2B5EF4-FFF2-40B4-BE49-F238E27FC236}">
+                  <a16:creationId xmlns:a16="http://schemas.microsoft.com/office/drawing/2014/main" id="{97FF50E7-F94C-948D-375B-200F9AB5EFBF}"/>
+                </a:ext>
+              </a:extLst>
+            </p:cNvPr>
+            <p:cNvSpPr/>
+            <p:nvPr/>
+          </p:nvSpPr>
+          <p:spPr>
+            <a:xfrm>
+              <a:off x="3065832" y="2902743"/>
+              <a:ext cx="593356" cy="569120"/>
+            </a:xfrm>
+            <a:custGeom>
+              <a:avLst/>
+              <a:gdLst>
+                <a:gd name="connsiteX0" fmla="*/ 0 w 609600"/>
+                <a:gd name="connsiteY0" fmla="*/ 384314 h 569844"/>
+                <a:gd name="connsiteX1" fmla="*/ 313634 w 609600"/>
+                <a:gd name="connsiteY1" fmla="*/ 569844 h 569844"/>
+                <a:gd name="connsiteX2" fmla="*/ 609600 w 609600"/>
+                <a:gd name="connsiteY2" fmla="*/ 176696 h 569844"/>
+                <a:gd name="connsiteX3" fmla="*/ 269460 w 609600"/>
+                <a:gd name="connsiteY3" fmla="*/ 0 h 569844"/>
+                <a:gd name="connsiteX4" fmla="*/ 0 w 609600"/>
+                <a:gd name="connsiteY4" fmla="*/ 384314 h 569844"/>
+              </a:gdLst>
+              <a:ahLst/>
+              <a:cxnLst>
+                <a:cxn ang="0">
+                  <a:pos x="connsiteX0" y="connsiteY0"/>
+                </a:cxn>
+                <a:cxn ang="0">
+                  <a:pos x="connsiteX1" y="connsiteY1"/>
+                </a:cxn>
+                <a:cxn ang="0">
+                  <a:pos x="connsiteX2" y="connsiteY2"/>
+                </a:cxn>
+                <a:cxn ang="0">
+                  <a:pos x="connsiteX3" y="connsiteY3"/>
+                </a:cxn>
+                <a:cxn ang="0">
+                  <a:pos x="connsiteX4" y="connsiteY4"/>
+                </a:cxn>
+              </a:cxnLst>
+              <a:rect l="l" t="t" r="r" b="b"/>
+              <a:pathLst>
+                <a:path w="609600" h="569844">
+                  <a:moveTo>
+                    <a:pt x="0" y="384314"/>
+                  </a:moveTo>
+                  <a:lnTo>
+                    <a:pt x="313634" y="569844"/>
+                  </a:lnTo>
+                  <a:lnTo>
+                    <a:pt x="609600" y="176696"/>
+                  </a:lnTo>
+                  <a:lnTo>
+                    <a:pt x="269460" y="0"/>
+                  </a:lnTo>
+                  <a:lnTo>
+                    <a:pt x="0" y="384314"/>
+                  </a:lnTo>
+                  <a:close/>
+                </a:path>
+              </a:pathLst>
+            </a:custGeom>
+            <a:solidFill>
+              <a:schemeClr val="bg1">
+                <a:lumMod val="75000"/>
+              </a:schemeClr>
+            </a:solidFill>
+          </p:spPr>
+          <p:style>
+            <a:lnRef idx="2">
+              <a:schemeClr val="accent1">
+                <a:shade val="15000"/>
+              </a:schemeClr>
+            </a:lnRef>
+            <a:fillRef idx="1">
+              <a:schemeClr val="accent1"/>
+            </a:fillRef>
+            <a:effectRef idx="0">
+              <a:schemeClr val="accent1"/>
+            </a:effectRef>
+            <a:fontRef idx="minor">
+              <a:schemeClr val="lt1"/>
+            </a:fontRef>
+          </p:style>
+          <p:txBody>
+            <a:bodyPr rtlCol="0" anchor="ctr"/>
+            <a:lstStyle/>
+            <a:p>
+              <a:pPr algn="ctr"/>
+              <a:endParaRPr lang="de-DE"/>
+            </a:p>
+          </p:txBody>
+        </p:sp>
+        <p:cxnSp>
+          <p:nvCxnSpPr>
+            <p:cNvPr id="33" name="Gerade Verbindung mit Pfeil 32">
+              <a:extLst>
+                <a:ext uri="{FF2B5EF4-FFF2-40B4-BE49-F238E27FC236}">
+                  <a16:creationId xmlns:a16="http://schemas.microsoft.com/office/drawing/2014/main" id="{42305927-F718-81D3-8893-E9AA9D7341A2}"/>
+                </a:ext>
+              </a:extLst>
+            </p:cNvPr>
+            <p:cNvCxnSpPr>
+              <a:cxnSpLocks/>
+            </p:cNvCxnSpPr>
+            <p:nvPr/>
+          </p:nvCxnSpPr>
+          <p:spPr>
+            <a:xfrm>
+              <a:off x="3079290" y="2806826"/>
+              <a:ext cx="65603" cy="266482"/>
+            </a:xfrm>
+            <a:prstGeom prst="straightConnector1">
+              <a:avLst/>
+            </a:prstGeom>
+            <a:ln>
+              <a:solidFill>
+                <a:schemeClr val="tx1"/>
+              </a:solidFill>
+              <a:tailEnd type="arrow" w="sm" len="med"/>
+            </a:ln>
+          </p:spPr>
+          <p:style>
+            <a:lnRef idx="1">
+              <a:schemeClr val="accent1"/>
+            </a:lnRef>
+            <a:fillRef idx="0">
+              <a:schemeClr val="accent1"/>
+            </a:fillRef>
+            <a:effectRef idx="0">
+              <a:schemeClr val="accent1"/>
+            </a:effectRef>
+            <a:fontRef idx="minor">
+              <a:schemeClr val="tx1"/>
+            </a:fontRef>
+          </p:style>
+        </p:cxnSp>
+        <p:sp>
+          <p:nvSpPr>
+            <p:cNvPr id="35" name="Geschweifte Klammer rechts 34">
+              <a:extLst>
+                <a:ext uri="{FF2B5EF4-FFF2-40B4-BE49-F238E27FC236}">
+                  <a16:creationId xmlns:a16="http://schemas.microsoft.com/office/drawing/2014/main" id="{A8E8C51F-62AA-3B18-872E-740B598C85F2}"/>
+                </a:ext>
+              </a:extLst>
+            </p:cNvPr>
+            <p:cNvSpPr/>
+            <p:nvPr/>
+          </p:nvSpPr>
+          <p:spPr>
+            <a:xfrm rot="3589506">
+              <a:off x="3512211" y="3108107"/>
+              <a:ext cx="155448" cy="1408777"/>
+            </a:xfrm>
+            <a:prstGeom prst="rightBrace">
+              <a:avLst/>
+            </a:prstGeom>
+          </p:spPr>
+          <p:style>
+            <a:lnRef idx="1">
+              <a:schemeClr val="accent1"/>
+            </a:lnRef>
+            <a:fillRef idx="0">
+              <a:schemeClr val="accent1"/>
+            </a:fillRef>
+            <a:effectRef idx="0">
+              <a:schemeClr val="accent1"/>
+            </a:effectRef>
+            <a:fontRef idx="minor">
+              <a:schemeClr val="tx1"/>
+            </a:fontRef>
+          </p:style>
+          <p:txBody>
+            <a:bodyPr rtlCol="0" anchor="ctr"/>
+            <a:lstStyle/>
+            <a:p>
+              <a:pPr algn="ctr"/>
+              <a:endParaRPr lang="de-DE"/>
+            </a:p>
+          </p:txBody>
+        </p:sp>
+        <p:sp>
+          <p:nvSpPr>
+            <p:cNvPr id="36" name="Textfeld 35">
+              <a:extLst>
+                <a:ext uri="{FF2B5EF4-FFF2-40B4-BE49-F238E27FC236}">
+                  <a16:creationId xmlns:a16="http://schemas.microsoft.com/office/drawing/2014/main" id="{945EA887-21A1-8A2E-DB91-6B8CBFF8270E}"/>
+                </a:ext>
+              </a:extLst>
+            </p:cNvPr>
+            <p:cNvSpPr txBox="1"/>
+            <p:nvPr/>
+          </p:nvSpPr>
+          <p:spPr>
+            <a:xfrm>
+              <a:off x="3395255" y="3821610"/>
+              <a:ext cx="978153" cy="215444"/>
+            </a:xfrm>
+            <a:prstGeom prst="rect">
+              <a:avLst/>
+            </a:prstGeom>
+            <a:noFill/>
+          </p:spPr>
+          <p:txBody>
+            <a:bodyPr wrap="none" rtlCol="0">
+              <a:spAutoFit/>
+            </a:bodyPr>
+            <a:lstStyle/>
+            <a:p>
+              <a:r>
+                <a:rPr lang="de-DE" sz="800" dirty="0" err="1"/>
+                <a:t>TerminalReception</a:t>
+              </a:r>
+              <a:endParaRPr lang="de-DE" sz="800" dirty="0"/>
+            </a:p>
+          </p:txBody>
+        </p:sp>
+        <p:sp>
+          <p:nvSpPr>
+            <p:cNvPr id="37" name="Geschweifte Klammer rechts 36">
+              <a:extLst>
+                <a:ext uri="{FF2B5EF4-FFF2-40B4-BE49-F238E27FC236}">
+                  <a16:creationId xmlns:a16="http://schemas.microsoft.com/office/drawing/2014/main" id="{A8641025-98A0-1E60-F203-0698EF186295}"/>
+                </a:ext>
+              </a:extLst>
+            </p:cNvPr>
+            <p:cNvSpPr/>
+            <p:nvPr/>
+          </p:nvSpPr>
+          <p:spPr>
+            <a:xfrm rot="3594234">
+              <a:off x="5072191" y="2223455"/>
+              <a:ext cx="155448" cy="1408777"/>
+            </a:xfrm>
+            <a:prstGeom prst="rightBrace">
+              <a:avLst/>
+            </a:prstGeom>
+          </p:spPr>
+          <p:style>
+            <a:lnRef idx="1">
+              <a:schemeClr val="accent1"/>
+            </a:lnRef>
+            <a:fillRef idx="0">
+              <a:schemeClr val="accent1"/>
+            </a:fillRef>
+            <a:effectRef idx="0">
+              <a:schemeClr val="accent1"/>
+            </a:effectRef>
+            <a:fontRef idx="minor">
+              <a:schemeClr val="tx1"/>
+            </a:fontRef>
+          </p:style>
+          <p:txBody>
+            <a:bodyPr rtlCol="0" anchor="ctr"/>
+            <a:lstStyle/>
+            <a:p>
+              <a:pPr algn="ctr"/>
+              <a:endParaRPr lang="de-DE"/>
+            </a:p>
+          </p:txBody>
+        </p:sp>
+        <p:sp>
+          <p:nvSpPr>
+            <p:cNvPr id="38" name="Textfeld 37">
+              <a:extLst>
+                <a:ext uri="{FF2B5EF4-FFF2-40B4-BE49-F238E27FC236}">
+                  <a16:creationId xmlns:a16="http://schemas.microsoft.com/office/drawing/2014/main" id="{648B4AF4-82D7-9941-1168-23A7CFB5BCFC}"/>
+                </a:ext>
+              </a:extLst>
+            </p:cNvPr>
+            <p:cNvSpPr txBox="1"/>
+            <p:nvPr/>
+          </p:nvSpPr>
+          <p:spPr>
+            <a:xfrm>
+              <a:off x="4935614" y="2940067"/>
+              <a:ext cx="809837" cy="215444"/>
+            </a:xfrm>
+            <a:prstGeom prst="rect">
+              <a:avLst/>
+            </a:prstGeom>
+            <a:noFill/>
+          </p:spPr>
+          <p:txBody>
+            <a:bodyPr wrap="none" rtlCol="0">
+              <a:spAutoFit/>
+            </a:bodyPr>
+            <a:lstStyle/>
+            <a:p>
+              <a:r>
+                <a:rPr lang="de-DE" sz="800" dirty="0" err="1"/>
+                <a:t>WireReception</a:t>
+              </a:r>
+              <a:endParaRPr lang="de-DE" sz="800" dirty="0"/>
+            </a:p>
+          </p:txBody>
+        </p:sp>
+        <p:cxnSp>
+          <p:nvCxnSpPr>
+            <p:cNvPr id="40" name="Gerade Verbindung mit Pfeil 39">
+              <a:extLst>
+                <a:ext uri="{FF2B5EF4-FFF2-40B4-BE49-F238E27FC236}">
+                  <a16:creationId xmlns:a16="http://schemas.microsoft.com/office/drawing/2014/main" id="{B0B2E0CA-C9E9-0560-5A98-AC7CF97FCFB8}"/>
+                </a:ext>
+              </a:extLst>
+            </p:cNvPr>
+            <p:cNvCxnSpPr>
+              <a:cxnSpLocks/>
+            </p:cNvCxnSpPr>
+            <p:nvPr/>
+          </p:nvCxnSpPr>
+          <p:spPr>
+            <a:xfrm>
+              <a:off x="4312237" y="1979168"/>
+              <a:ext cx="65603" cy="266482"/>
+            </a:xfrm>
+            <a:prstGeom prst="straightConnector1">
+              <a:avLst/>
+            </a:prstGeom>
+            <a:ln>
+              <a:solidFill>
+                <a:schemeClr val="tx1"/>
+              </a:solidFill>
+              <a:tailEnd type="arrow" w="sm" len="med"/>
+            </a:ln>
+          </p:spPr>
+          <p:style>
+            <a:lnRef idx="1">
+              <a:schemeClr val="accent1"/>
+            </a:lnRef>
+            <a:fillRef idx="0">
+              <a:schemeClr val="accent1"/>
+            </a:fillRef>
+            <a:effectRef idx="0">
+              <a:schemeClr val="accent1"/>
+            </a:effectRef>
+            <a:fontRef idx="minor">
+              <a:schemeClr val="tx1"/>
+            </a:fontRef>
+          </p:style>
+        </p:cxnSp>
+        <p:cxnSp>
+          <p:nvCxnSpPr>
+            <p:cNvPr id="41" name="Gerade Verbindung mit Pfeil 40">
+              <a:extLst>
+                <a:ext uri="{FF2B5EF4-FFF2-40B4-BE49-F238E27FC236}">
+                  <a16:creationId xmlns:a16="http://schemas.microsoft.com/office/drawing/2014/main" id="{A7D73AE4-B431-A873-D9A9-FEDD1EE9065A}"/>
+                </a:ext>
+              </a:extLst>
+            </p:cNvPr>
+            <p:cNvCxnSpPr>
+              <a:cxnSpLocks/>
+            </p:cNvCxnSpPr>
+            <p:nvPr/>
+          </p:nvCxnSpPr>
+          <p:spPr>
+            <a:xfrm>
+              <a:off x="4883396" y="1711409"/>
+              <a:ext cx="65603" cy="266482"/>
+            </a:xfrm>
+            <a:prstGeom prst="straightConnector1">
+              <a:avLst/>
+            </a:prstGeom>
+            <a:ln>
+              <a:solidFill>
+                <a:schemeClr val="tx1"/>
+              </a:solidFill>
+              <a:tailEnd type="arrow" w="sm" len="med"/>
+            </a:ln>
+          </p:spPr>
+          <p:style>
+            <a:lnRef idx="1">
+              <a:schemeClr val="accent1"/>
+            </a:lnRef>
+            <a:fillRef idx="0">
+              <a:schemeClr val="accent1"/>
+            </a:fillRef>
+            <a:effectRef idx="0">
+              <a:schemeClr val="accent1"/>
+            </a:effectRef>
+            <a:fontRef idx="minor">
+              <a:schemeClr val="tx1"/>
+            </a:fontRef>
+          </p:style>
+        </p:cxnSp>
+        <p:sp>
+          <p:nvSpPr>
+            <p:cNvPr id="42" name="Textfeld 41">
+              <a:extLst>
+                <a:ext uri="{FF2B5EF4-FFF2-40B4-BE49-F238E27FC236}">
+                  <a16:creationId xmlns:a16="http://schemas.microsoft.com/office/drawing/2014/main" id="{843BAE62-4312-AD33-6E21-2D9CECAE930F}"/>
+                </a:ext>
+              </a:extLst>
+            </p:cNvPr>
+            <p:cNvSpPr txBox="1"/>
+            <p:nvPr/>
+          </p:nvSpPr>
+          <p:spPr>
+            <a:xfrm>
+              <a:off x="3018367" y="2633380"/>
+              <a:ext cx="824265" cy="215444"/>
+            </a:xfrm>
+            <a:prstGeom prst="rect">
+              <a:avLst/>
+            </a:prstGeom>
+            <a:noFill/>
+          </p:spPr>
+          <p:txBody>
+            <a:bodyPr wrap="none" rtlCol="0">
+              <a:spAutoFit/>
+            </a:bodyPr>
+            <a:lstStyle/>
+            <a:p>
+              <a:r>
+                <a:rPr lang="de-DE" sz="800" dirty="0" err="1"/>
+                <a:t>PrimaryLocking</a:t>
+              </a:r>
+              <a:endParaRPr lang="de-DE" sz="800" dirty="0"/>
+            </a:p>
+          </p:txBody>
+        </p:sp>
+        <p:sp>
+          <p:nvSpPr>
+            <p:cNvPr id="43" name="Textfeld 42">
+              <a:extLst>
+                <a:ext uri="{FF2B5EF4-FFF2-40B4-BE49-F238E27FC236}">
+                  <a16:creationId xmlns:a16="http://schemas.microsoft.com/office/drawing/2014/main" id="{2341EBB5-B0A7-CCE5-B1E7-EACCE21406A3}"/>
+                </a:ext>
+              </a:extLst>
+            </p:cNvPr>
+            <p:cNvSpPr txBox="1"/>
+            <p:nvPr/>
+          </p:nvSpPr>
+          <p:spPr>
+            <a:xfrm>
+              <a:off x="3477009" y="1796937"/>
+              <a:ext cx="896399" cy="215444"/>
+            </a:xfrm>
+            <a:prstGeom prst="rect">
+              <a:avLst/>
+            </a:prstGeom>
+            <a:noFill/>
+          </p:spPr>
+          <p:txBody>
+            <a:bodyPr wrap="none" rtlCol="0">
+              <a:spAutoFit/>
+            </a:bodyPr>
+            <a:lstStyle/>
+            <a:p>
+              <a:r>
+                <a:rPr lang="de-DE" sz="800" dirty="0" err="1"/>
+                <a:t>Conductor</a:t>
+              </a:r>
+              <a:r>
+                <a:rPr lang="de-DE" sz="800" dirty="0"/>
+                <a:t> Crimp</a:t>
+              </a:r>
+            </a:p>
+          </p:txBody>
+        </p:sp>
+        <p:sp>
+          <p:nvSpPr>
+            <p:cNvPr id="44" name="Textfeld 43">
+              <a:extLst>
+                <a:ext uri="{FF2B5EF4-FFF2-40B4-BE49-F238E27FC236}">
+                  <a16:creationId xmlns:a16="http://schemas.microsoft.com/office/drawing/2014/main" id="{B8C45ABD-375E-9009-659D-6973FF872B81}"/>
+                </a:ext>
+              </a:extLst>
+            </p:cNvPr>
+            <p:cNvSpPr txBox="1"/>
+            <p:nvPr/>
+          </p:nvSpPr>
+          <p:spPr>
+            <a:xfrm>
+              <a:off x="4074180" y="1528886"/>
+              <a:ext cx="872355" cy="215444"/>
+            </a:xfrm>
+            <a:prstGeom prst="rect">
+              <a:avLst/>
+            </a:prstGeom>
+            <a:noFill/>
+          </p:spPr>
+          <p:txBody>
+            <a:bodyPr wrap="none" rtlCol="0">
+              <a:spAutoFit/>
+            </a:bodyPr>
+            <a:lstStyle/>
+            <a:p>
+              <a:r>
+                <a:rPr lang="de-DE" sz="800" dirty="0" err="1"/>
+                <a:t>Insulation</a:t>
+              </a:r>
+              <a:r>
+                <a:rPr lang="de-DE" sz="800" dirty="0"/>
+                <a:t> Crimp</a:t>
+              </a:r>
+            </a:p>
+          </p:txBody>
+        </p:sp>
+        <p:cxnSp>
+          <p:nvCxnSpPr>
+            <p:cNvPr id="58" name="Gerade Verbindung mit Pfeil 57">
+              <a:extLst>
+                <a:ext uri="{FF2B5EF4-FFF2-40B4-BE49-F238E27FC236}">
+                  <a16:creationId xmlns:a16="http://schemas.microsoft.com/office/drawing/2014/main" id="{D503D932-3C00-BFF3-46C0-728A256AAEB3}"/>
+                </a:ext>
+              </a:extLst>
+            </p:cNvPr>
+            <p:cNvCxnSpPr>
+              <a:cxnSpLocks/>
+            </p:cNvCxnSpPr>
+            <p:nvPr/>
+          </p:nvCxnSpPr>
+          <p:spPr>
+            <a:xfrm flipV="1">
+              <a:off x="2764905" y="2219469"/>
+              <a:ext cx="2958462" cy="1609002"/>
+            </a:xfrm>
+            <a:prstGeom prst="straightConnector1">
+              <a:avLst/>
+            </a:prstGeom>
+            <a:ln w="28575">
+              <a:solidFill>
+                <a:schemeClr val="accent2"/>
+              </a:solidFill>
+              <a:tailEnd type="triangle" w="med" len="med"/>
+            </a:ln>
+          </p:spPr>
+          <p:style>
+            <a:lnRef idx="1">
+              <a:schemeClr val="accent2"/>
+            </a:lnRef>
+            <a:fillRef idx="0">
+              <a:schemeClr val="accent2"/>
+            </a:fillRef>
+            <a:effectRef idx="0">
+              <a:schemeClr val="accent2"/>
+            </a:effectRef>
+            <a:fontRef idx="minor">
+              <a:schemeClr val="tx1"/>
+            </a:fontRef>
+          </p:style>
+        </p:cxnSp>
+        <p:sp>
+          <p:nvSpPr>
+            <p:cNvPr id="60" name="Textfeld 59">
+              <a:extLst>
+                <a:ext uri="{FF2B5EF4-FFF2-40B4-BE49-F238E27FC236}">
+                  <a16:creationId xmlns:a16="http://schemas.microsoft.com/office/drawing/2014/main" id="{CF971F66-4A7E-20EC-45D8-B8DF20E2B480}"/>
+                </a:ext>
+              </a:extLst>
+            </p:cNvPr>
+            <p:cNvSpPr txBox="1"/>
+            <p:nvPr/>
+          </p:nvSpPr>
+          <p:spPr>
+            <a:xfrm>
+              <a:off x="5689329" y="1988216"/>
+              <a:ext cx="292068" cy="369332"/>
+            </a:xfrm>
+            <a:prstGeom prst="rect">
+              <a:avLst/>
+            </a:prstGeom>
+            <a:noFill/>
+          </p:spPr>
+          <p:txBody>
+            <a:bodyPr wrap="none" rtlCol="0">
+              <a:spAutoFit/>
+            </a:bodyPr>
+            <a:lstStyle/>
+            <a:p>
+              <a:r>
+                <a:rPr lang="de-DE" dirty="0">
+                  <a:solidFill>
+                    <a:schemeClr val="accent2"/>
+                  </a:solidFill>
+                </a:rPr>
+                <a:t>Z</a:t>
+              </a:r>
+            </a:p>
+          </p:txBody>
+        </p:sp>
+        <p:sp>
+          <p:nvSpPr>
+            <p:cNvPr id="62" name="Textfeld 61">
+              <a:extLst>
+                <a:ext uri="{FF2B5EF4-FFF2-40B4-BE49-F238E27FC236}">
+                  <a16:creationId xmlns:a16="http://schemas.microsoft.com/office/drawing/2014/main" id="{3C727C5F-EF16-AACB-9E60-EDD269DEBFE8}"/>
+                </a:ext>
+              </a:extLst>
+            </p:cNvPr>
+            <p:cNvSpPr txBox="1"/>
+            <p:nvPr/>
+          </p:nvSpPr>
+          <p:spPr>
+            <a:xfrm>
+              <a:off x="2616466" y="2210004"/>
+              <a:ext cx="296876" cy="369332"/>
+            </a:xfrm>
+            <a:prstGeom prst="rect">
+              <a:avLst/>
+            </a:prstGeom>
+            <a:noFill/>
+          </p:spPr>
+          <p:txBody>
+            <a:bodyPr wrap="none" rtlCol="0">
+              <a:spAutoFit/>
+            </a:bodyPr>
+            <a:lstStyle/>
+            <a:p>
+              <a:r>
+                <a:rPr lang="de-DE" dirty="0">
+                  <a:solidFill>
+                    <a:schemeClr val="accent6"/>
+                  </a:solidFill>
+                </a:rPr>
+                <a:t>Y</a:t>
+              </a:r>
+            </a:p>
+          </p:txBody>
+        </p:sp>
+        <p:cxnSp>
+          <p:nvCxnSpPr>
+            <p:cNvPr id="61" name="Gerade Verbindung mit Pfeil 60">
+              <a:extLst>
+                <a:ext uri="{FF2B5EF4-FFF2-40B4-BE49-F238E27FC236}">
+                  <a16:creationId xmlns:a16="http://schemas.microsoft.com/office/drawing/2014/main" id="{F5F3DAF1-B222-7F9A-CC6B-EEE2F2BAC00E}"/>
+                </a:ext>
+              </a:extLst>
+            </p:cNvPr>
+            <p:cNvCxnSpPr>
+              <a:cxnSpLocks/>
+            </p:cNvCxnSpPr>
+            <p:nvPr/>
+          </p:nvCxnSpPr>
+          <p:spPr>
+            <a:xfrm flipV="1">
+              <a:off x="2764905" y="2520129"/>
+              <a:ext cx="0" cy="1301481"/>
+            </a:xfrm>
+            <a:prstGeom prst="straightConnector1">
+              <a:avLst/>
+            </a:prstGeom>
+            <a:ln w="28575">
+              <a:solidFill>
+                <a:schemeClr val="accent6"/>
+              </a:solidFill>
+              <a:tailEnd type="triangle" w="med" len="med"/>
+            </a:ln>
+          </p:spPr>
+          <p:style>
+            <a:lnRef idx="1">
+              <a:schemeClr val="accent2"/>
+            </a:lnRef>
+            <a:fillRef idx="0">
+              <a:schemeClr val="accent2"/>
+            </a:fillRef>
+            <a:effectRef idx="0">
+              <a:schemeClr val="accent2"/>
+            </a:effectRef>
+            <a:fontRef idx="minor">
+              <a:schemeClr val="tx1"/>
+            </a:fontRef>
+          </p:style>
+        </p:cxnSp>
+        <p:cxnSp>
+          <p:nvCxnSpPr>
+            <p:cNvPr id="64" name="Gerade Verbindung mit Pfeil 63">
+              <a:extLst>
+                <a:ext uri="{FF2B5EF4-FFF2-40B4-BE49-F238E27FC236}">
+                  <a16:creationId xmlns:a16="http://schemas.microsoft.com/office/drawing/2014/main" id="{ADBE77F9-5152-C0D8-F5FF-FDC4280F364C}"/>
+                </a:ext>
+              </a:extLst>
+            </p:cNvPr>
+            <p:cNvCxnSpPr>
+              <a:cxnSpLocks/>
+            </p:cNvCxnSpPr>
+            <p:nvPr/>
+          </p:nvCxnSpPr>
+          <p:spPr>
+            <a:xfrm flipH="1" flipV="1">
+              <a:off x="1794933" y="3271371"/>
+              <a:ext cx="972659" cy="557100"/>
+            </a:xfrm>
+            <a:prstGeom prst="straightConnector1">
+              <a:avLst/>
+            </a:prstGeom>
+            <a:ln w="28575">
+              <a:solidFill>
+                <a:schemeClr val="accent1"/>
+              </a:solidFill>
+              <a:tailEnd type="triangle" w="med" len="med"/>
+            </a:ln>
+          </p:spPr>
+          <p:style>
+            <a:lnRef idx="1">
+              <a:schemeClr val="accent2"/>
+            </a:lnRef>
+            <a:fillRef idx="0">
+              <a:schemeClr val="accent2"/>
+            </a:fillRef>
+            <a:effectRef idx="0">
+              <a:schemeClr val="accent2"/>
+            </a:effectRef>
+            <a:fontRef idx="minor">
+              <a:schemeClr val="tx1"/>
+            </a:fontRef>
+          </p:style>
+        </p:cxnSp>
+        <p:sp>
+          <p:nvSpPr>
+            <p:cNvPr id="65" name="Textfeld 64">
+              <a:extLst>
+                <a:ext uri="{FF2B5EF4-FFF2-40B4-BE49-F238E27FC236}">
+                  <a16:creationId xmlns:a16="http://schemas.microsoft.com/office/drawing/2014/main" id="{AC99EC9E-AB2B-3D0F-015A-284FF63021F0}"/>
+                </a:ext>
+              </a:extLst>
+            </p:cNvPr>
+            <p:cNvSpPr txBox="1"/>
+            <p:nvPr/>
+          </p:nvSpPr>
+          <p:spPr>
+            <a:xfrm>
+              <a:off x="1577498" y="2994656"/>
+              <a:ext cx="304892" cy="369332"/>
+            </a:xfrm>
+            <a:prstGeom prst="rect">
+              <a:avLst/>
+            </a:prstGeom>
+            <a:noFill/>
+            <a:ln>
+              <a:noFill/>
+            </a:ln>
+          </p:spPr>
+          <p:txBody>
+            <a:bodyPr wrap="none" rtlCol="0">
+              <a:spAutoFit/>
+            </a:bodyPr>
+            <a:lstStyle/>
+            <a:p>
+              <a:r>
+                <a:rPr lang="de-DE" dirty="0">
+                  <a:solidFill>
+                    <a:schemeClr val="accent1"/>
+                  </a:solidFill>
+                </a:rPr>
+                <a:t>X</a:t>
+              </a:r>
+            </a:p>
+          </p:txBody>
+        </p:sp>
+        <p:grpSp>
+          <p:nvGrpSpPr>
+            <p:cNvPr id="56" name="Gruppieren 55">
+              <a:extLst>
+                <a:ext uri="{FF2B5EF4-FFF2-40B4-BE49-F238E27FC236}">
+                  <a16:creationId xmlns:a16="http://schemas.microsoft.com/office/drawing/2014/main" id="{509F5A9C-B1DC-1E9F-46FB-6D4CE3AE915D}"/>
+                </a:ext>
+              </a:extLst>
+            </p:cNvPr>
+            <p:cNvGrpSpPr/>
+            <p:nvPr/>
+          </p:nvGrpSpPr>
+          <p:grpSpPr>
+            <a:xfrm>
+              <a:off x="2732186" y="3791908"/>
+              <a:ext cx="72000" cy="73126"/>
+              <a:chOff x="1489075" y="2578663"/>
+              <a:chExt cx="72000" cy="73126"/>
+            </a:xfrm>
+            <a:scene3d>
+              <a:camera prst="isometricLeftDown"/>
+              <a:lightRig rig="threePt" dir="t"/>
+            </a:scene3d>
+          </p:grpSpPr>
+          <p:cxnSp>
+            <p:nvCxnSpPr>
+              <p:cNvPr id="47" name="Gerader Verbinder 46">
+                <a:extLst>
+                  <a:ext uri="{FF2B5EF4-FFF2-40B4-BE49-F238E27FC236}">
+                    <a16:creationId xmlns:a16="http://schemas.microsoft.com/office/drawing/2014/main" id="{34FE93E5-4C74-4DF5-BDEC-33EBD5621364}"/>
+                  </a:ext>
+                </a:extLst>
+              </p:cNvPr>
+              <p:cNvCxnSpPr>
+                <a:cxnSpLocks/>
+              </p:cNvCxnSpPr>
+              <p:nvPr/>
+            </p:nvCxnSpPr>
+            <p:spPr>
+              <a:xfrm>
+                <a:off x="1489075" y="2579789"/>
+                <a:ext cx="72000" cy="72000"/>
+              </a:xfrm>
+              <a:prstGeom prst="line">
+                <a:avLst/>
+              </a:prstGeom>
+              <a:ln w="19050">
+                <a:solidFill>
+                  <a:srgbClr val="FF0000"/>
+                </a:solidFill>
+              </a:ln>
+            </p:spPr>
+            <p:style>
+              <a:lnRef idx="1">
+                <a:schemeClr val="accent1"/>
+              </a:lnRef>
+              <a:fillRef idx="0">
+                <a:schemeClr val="accent1"/>
+              </a:fillRef>
+              <a:effectRef idx="0">
+                <a:schemeClr val="accent1"/>
+              </a:effectRef>
+              <a:fontRef idx="minor">
+                <a:schemeClr val="tx1"/>
+              </a:fontRef>
+            </p:style>
+          </p:cxnSp>
+          <p:cxnSp>
+            <p:nvCxnSpPr>
+              <p:cNvPr id="53" name="Gerader Verbinder 52">
+                <a:extLst>
+                  <a:ext uri="{FF2B5EF4-FFF2-40B4-BE49-F238E27FC236}">
+                    <a16:creationId xmlns:a16="http://schemas.microsoft.com/office/drawing/2014/main" id="{B8E1C6C7-AC51-D88D-30D8-905E2F5EC924}"/>
+                  </a:ext>
+                </a:extLst>
+              </p:cNvPr>
+              <p:cNvCxnSpPr>
+                <a:cxnSpLocks/>
+              </p:cNvCxnSpPr>
+              <p:nvPr/>
+            </p:nvCxnSpPr>
+            <p:spPr>
+              <a:xfrm flipV="1">
+                <a:off x="1489075" y="2578663"/>
+                <a:ext cx="72000" cy="73126"/>
+              </a:xfrm>
+              <a:prstGeom prst="line">
+                <a:avLst/>
+              </a:prstGeom>
+              <a:ln w="19050">
+                <a:solidFill>
+                  <a:srgbClr val="FF0000"/>
+                </a:solidFill>
+              </a:ln>
+            </p:spPr>
+            <p:style>
+              <a:lnRef idx="1">
+                <a:schemeClr val="accent1"/>
+              </a:lnRef>
+              <a:fillRef idx="0">
+                <a:schemeClr val="accent1"/>
+              </a:fillRef>
+              <a:effectRef idx="0">
+                <a:schemeClr val="accent1"/>
+              </a:effectRef>
+              <a:fontRef idx="minor">
+                <a:schemeClr val="tx1"/>
+              </a:fontRef>
+            </p:style>
+          </p:cxnSp>
+        </p:grpSp>
+        <p:sp>
+          <p:nvSpPr>
+            <p:cNvPr id="75" name="Textfeld 74">
+              <a:extLst>
+                <a:ext uri="{FF2B5EF4-FFF2-40B4-BE49-F238E27FC236}">
+                  <a16:creationId xmlns:a16="http://schemas.microsoft.com/office/drawing/2014/main" id="{1558A0ED-2348-1645-39D2-43C58D1109B8}"/>
+                </a:ext>
+              </a:extLst>
+            </p:cNvPr>
+            <p:cNvSpPr txBox="1"/>
+            <p:nvPr/>
+          </p:nvSpPr>
+          <p:spPr>
+            <a:xfrm>
+              <a:off x="2529290" y="4294371"/>
+              <a:ext cx="1378904" cy="215444"/>
+            </a:xfrm>
+            <a:prstGeom prst="rect">
+              <a:avLst/>
+            </a:prstGeom>
+            <a:noFill/>
+          </p:spPr>
+          <p:txBody>
+            <a:bodyPr wrap="none" rtlCol="0">
+              <a:spAutoFit/>
+            </a:bodyPr>
+            <a:lstStyle/>
+            <a:p>
+              <a:r>
+                <a:rPr lang="de-DE" sz="800" i="1" u="sng" dirty="0" err="1"/>
+                <a:t>WireReception.Rotation</a:t>
+              </a:r>
+              <a:r>
+                <a:rPr lang="de-DE" sz="800" i="1" u="sng" dirty="0"/>
+                <a:t> = 0°</a:t>
+              </a:r>
+            </a:p>
+          </p:txBody>
+        </p:sp>
+      </p:grpSp>
+      <p:grpSp>
+        <p:nvGrpSpPr>
+          <p:cNvPr id="111" name="Gruppieren 110">
+            <a:extLst>
+              <a:ext uri="{FF2B5EF4-FFF2-40B4-BE49-F238E27FC236}">
+                <a16:creationId xmlns:a16="http://schemas.microsoft.com/office/drawing/2014/main" id="{35CA5197-AE61-F769-122E-A284665139C0}"/>
+              </a:ext>
+            </a:extLst>
+          </p:cNvPr>
+          <p:cNvGrpSpPr/>
+          <p:nvPr/>
+        </p:nvGrpSpPr>
+        <p:grpSpPr>
+          <a:xfrm>
+            <a:off x="5333233" y="3089114"/>
+            <a:ext cx="3926529" cy="2584684"/>
+            <a:chOff x="7647072" y="3089114"/>
+            <a:chExt cx="3926529" cy="2584684"/>
+          </a:xfrm>
+        </p:grpSpPr>
+        <p:sp>
+          <p:nvSpPr>
+            <p:cNvPr id="76" name="Rechteck 75">
+              <a:extLst>
+                <a:ext uri="{FF2B5EF4-FFF2-40B4-BE49-F238E27FC236}">
+                  <a16:creationId xmlns:a16="http://schemas.microsoft.com/office/drawing/2014/main" id="{86A25316-6088-CAD2-8988-BA73CA475EED}"/>
+                </a:ext>
+              </a:extLst>
+            </p:cNvPr>
+            <p:cNvSpPr/>
+            <p:nvPr/>
+          </p:nvSpPr>
+          <p:spPr>
+            <a:xfrm>
+              <a:off x="7647072" y="4137263"/>
+              <a:ext cx="3926529" cy="461247"/>
+            </a:xfrm>
+            <a:prstGeom prst="rect">
+              <a:avLst/>
+            </a:prstGeom>
+            <a:solidFill>
+              <a:schemeClr val="bg2">
+                <a:lumMod val="75000"/>
+              </a:schemeClr>
+            </a:solidFill>
+            <a:scene3d>
+              <a:camera prst="isometricTopUp"/>
+              <a:lightRig rig="threePt" dir="t"/>
+            </a:scene3d>
+          </p:spPr>
+          <p:style>
+            <a:lnRef idx="2">
+              <a:schemeClr val="accent1">
+                <a:shade val="15000"/>
+              </a:schemeClr>
+            </a:lnRef>
+            <a:fillRef idx="1">
+              <a:schemeClr val="accent1"/>
+            </a:fillRef>
+            <a:effectRef idx="0">
+              <a:schemeClr val="accent1"/>
+            </a:effectRef>
+            <a:fontRef idx="minor">
+              <a:schemeClr val="lt1"/>
+            </a:fontRef>
+          </p:style>
+          <p:txBody>
+            <a:bodyPr rtlCol="0" anchor="ctr"/>
+            <a:lstStyle/>
+            <a:p>
+              <a:pPr algn="ctr"/>
+              <a:endParaRPr lang="de-DE"/>
+            </a:p>
+          </p:txBody>
+        </p:sp>
+        <p:sp>
+          <p:nvSpPr>
+            <p:cNvPr id="77" name="Rechteck 76">
+              <a:extLst>
+                <a:ext uri="{FF2B5EF4-FFF2-40B4-BE49-F238E27FC236}">
+                  <a16:creationId xmlns:a16="http://schemas.microsoft.com/office/drawing/2014/main" id="{70183CC9-9227-392D-0F7E-E5F75064CBE1}"/>
+                </a:ext>
+              </a:extLst>
+            </p:cNvPr>
+            <p:cNvSpPr/>
+            <p:nvPr/>
+          </p:nvSpPr>
+          <p:spPr>
+            <a:xfrm>
+              <a:off x="7999535" y="4747528"/>
+              <a:ext cx="453328" cy="461247"/>
+            </a:xfrm>
+            <a:prstGeom prst="rect">
+              <a:avLst/>
+            </a:prstGeom>
+            <a:solidFill>
+              <a:schemeClr val="bg2">
+                <a:lumMod val="75000"/>
+              </a:schemeClr>
+            </a:solidFill>
+            <a:scene3d>
+              <a:camera prst="isometricLeftDown"/>
+              <a:lightRig rig="threePt" dir="t"/>
+            </a:scene3d>
+          </p:spPr>
+          <p:style>
+            <a:lnRef idx="2">
+              <a:schemeClr val="accent1">
+                <a:shade val="15000"/>
+              </a:schemeClr>
+            </a:lnRef>
+            <a:fillRef idx="1">
+              <a:schemeClr val="accent1"/>
+            </a:fillRef>
+            <a:effectRef idx="0">
+              <a:schemeClr val="accent1"/>
+            </a:effectRef>
+            <a:fontRef idx="minor">
+              <a:schemeClr val="lt1"/>
+            </a:fontRef>
+          </p:style>
+          <p:txBody>
+            <a:bodyPr rtlCol="0" anchor="ctr"/>
+            <a:lstStyle/>
+            <a:p>
+              <a:pPr algn="ctr"/>
+              <a:endParaRPr lang="de-DE"/>
+            </a:p>
+          </p:txBody>
+        </p:sp>
+        <p:sp>
+          <p:nvSpPr>
+            <p:cNvPr id="78" name="Rechteck 77">
+              <a:extLst>
+                <a:ext uri="{FF2B5EF4-FFF2-40B4-BE49-F238E27FC236}">
+                  <a16:creationId xmlns:a16="http://schemas.microsoft.com/office/drawing/2014/main" id="{BDDE391C-786F-3154-6559-633EFDF759EA}"/>
+                </a:ext>
+              </a:extLst>
+            </p:cNvPr>
+            <p:cNvSpPr/>
+            <p:nvPr/>
+          </p:nvSpPr>
+          <p:spPr>
+            <a:xfrm>
+              <a:off x="7986011" y="4211772"/>
+              <a:ext cx="1713760" cy="461247"/>
+            </a:xfrm>
+            <a:prstGeom prst="rect">
+              <a:avLst/>
+            </a:prstGeom>
+            <a:solidFill>
+              <a:schemeClr val="bg2">
+                <a:lumMod val="75000"/>
+              </a:schemeClr>
+            </a:solidFill>
+            <a:scene3d>
+              <a:camera prst="isometricTopUp"/>
+              <a:lightRig rig="threePt" dir="t"/>
+            </a:scene3d>
+          </p:spPr>
+          <p:style>
+            <a:lnRef idx="2">
+              <a:schemeClr val="accent1">
+                <a:shade val="15000"/>
+              </a:schemeClr>
+            </a:lnRef>
+            <a:fillRef idx="1">
+              <a:schemeClr val="accent1"/>
+            </a:fillRef>
+            <a:effectRef idx="0">
+              <a:schemeClr val="accent1"/>
+            </a:effectRef>
+            <a:fontRef idx="minor">
+              <a:schemeClr val="lt1"/>
+            </a:fontRef>
+          </p:style>
+          <p:txBody>
+            <a:bodyPr rtlCol="0" anchor="ctr"/>
+            <a:lstStyle/>
+            <a:p>
+              <a:pPr algn="ctr"/>
+              <a:endParaRPr lang="de-DE"/>
+            </a:p>
+          </p:txBody>
+        </p:sp>
+        <p:sp>
+          <p:nvSpPr>
+            <p:cNvPr id="79" name="Rechteck 78">
+              <a:extLst>
+                <a:ext uri="{FF2B5EF4-FFF2-40B4-BE49-F238E27FC236}">
+                  <a16:creationId xmlns:a16="http://schemas.microsoft.com/office/drawing/2014/main" id="{A3A6A084-F550-0933-570C-6F285689EEC0}"/>
+                </a:ext>
+              </a:extLst>
+            </p:cNvPr>
+            <p:cNvSpPr/>
+            <p:nvPr/>
+          </p:nvSpPr>
+          <p:spPr>
+            <a:xfrm>
+              <a:off x="8142371" y="4491524"/>
+              <a:ext cx="1713760" cy="461247"/>
+            </a:xfrm>
+            <a:prstGeom prst="rect">
+              <a:avLst/>
+            </a:prstGeom>
+            <a:solidFill>
+              <a:schemeClr val="bg2">
+                <a:lumMod val="75000"/>
+              </a:schemeClr>
+            </a:solidFill>
+            <a:scene3d>
+              <a:camera prst="isometricRightUp"/>
+              <a:lightRig rig="threePt" dir="t"/>
+            </a:scene3d>
+          </p:spPr>
+          <p:style>
+            <a:lnRef idx="2">
+              <a:schemeClr val="accent1">
+                <a:shade val="15000"/>
+              </a:schemeClr>
+            </a:lnRef>
+            <a:fillRef idx="1">
+              <a:schemeClr val="accent1"/>
+            </a:fillRef>
+            <a:effectRef idx="0">
+              <a:schemeClr val="accent1"/>
+            </a:effectRef>
+            <a:fontRef idx="minor">
+              <a:schemeClr val="lt1"/>
+            </a:fontRef>
+          </p:style>
+          <p:txBody>
+            <a:bodyPr rtlCol="0" anchor="ctr"/>
+            <a:lstStyle/>
+            <a:p>
+              <a:pPr algn="ctr"/>
+              <a:endParaRPr lang="de-DE"/>
+            </a:p>
+          </p:txBody>
+        </p:sp>
+        <p:sp>
+          <p:nvSpPr>
+            <p:cNvPr id="80" name="Rechteck 79">
+              <a:extLst>
+                <a:ext uri="{FF2B5EF4-FFF2-40B4-BE49-F238E27FC236}">
+                  <a16:creationId xmlns:a16="http://schemas.microsoft.com/office/drawing/2014/main" id="{0EECA302-B885-1A3F-51D2-F2DC2BB21DAC}"/>
+                </a:ext>
+              </a:extLst>
+            </p:cNvPr>
+            <p:cNvSpPr/>
+            <p:nvPr/>
+          </p:nvSpPr>
+          <p:spPr>
+            <a:xfrm>
+              <a:off x="10311353" y="3089114"/>
+              <a:ext cx="245426" cy="686456"/>
+            </a:xfrm>
+            <a:prstGeom prst="rect">
+              <a:avLst/>
+            </a:prstGeom>
+            <a:solidFill>
+              <a:schemeClr val="bg2">
+                <a:lumMod val="75000"/>
+              </a:schemeClr>
+            </a:solidFill>
+            <a:scene3d>
+              <a:camera prst="isometricRightUp"/>
+              <a:lightRig rig="threePt" dir="t"/>
+            </a:scene3d>
+          </p:spPr>
+          <p:style>
+            <a:lnRef idx="2">
+              <a:schemeClr val="accent1">
+                <a:shade val="15000"/>
+              </a:schemeClr>
+            </a:lnRef>
+            <a:fillRef idx="1">
+              <a:schemeClr val="accent1"/>
+            </a:fillRef>
+            <a:effectRef idx="0">
+              <a:schemeClr val="accent1"/>
+            </a:effectRef>
+            <a:fontRef idx="minor">
+              <a:schemeClr val="lt1"/>
+            </a:fontRef>
+          </p:style>
+          <p:txBody>
+            <a:bodyPr rtlCol="0" anchor="ctr"/>
+            <a:lstStyle/>
+            <a:p>
+              <a:pPr algn="ctr"/>
+              <a:endParaRPr lang="de-DE"/>
+            </a:p>
+          </p:txBody>
+        </p:sp>
+        <p:sp>
+          <p:nvSpPr>
+            <p:cNvPr id="81" name="Rechteck 80">
+              <a:extLst>
+                <a:ext uri="{FF2B5EF4-FFF2-40B4-BE49-F238E27FC236}">
+                  <a16:creationId xmlns:a16="http://schemas.microsoft.com/office/drawing/2014/main" id="{E10071E1-7013-50FC-1F76-FAD551575290}"/>
+                </a:ext>
+              </a:extLst>
+            </p:cNvPr>
+            <p:cNvSpPr/>
+            <p:nvPr/>
+          </p:nvSpPr>
+          <p:spPr>
+            <a:xfrm>
+              <a:off x="10636439" y="3273883"/>
+              <a:ext cx="245426" cy="686456"/>
+            </a:xfrm>
+            <a:prstGeom prst="rect">
+              <a:avLst/>
+            </a:prstGeom>
+            <a:solidFill>
+              <a:schemeClr val="bg2">
+                <a:lumMod val="75000"/>
+              </a:schemeClr>
+            </a:solidFill>
+            <a:scene3d>
+              <a:camera prst="isometricRightUp"/>
+              <a:lightRig rig="threePt" dir="t"/>
+            </a:scene3d>
+          </p:spPr>
+          <p:style>
+            <a:lnRef idx="2">
+              <a:schemeClr val="accent1">
+                <a:shade val="15000"/>
+              </a:schemeClr>
+            </a:lnRef>
+            <a:fillRef idx="1">
+              <a:schemeClr val="accent1"/>
+            </a:fillRef>
+            <a:effectRef idx="0">
+              <a:schemeClr val="accent1"/>
+            </a:effectRef>
+            <a:fontRef idx="minor">
+              <a:schemeClr val="lt1"/>
+            </a:fontRef>
+          </p:style>
+          <p:txBody>
+            <a:bodyPr rtlCol="0" anchor="ctr"/>
+            <a:lstStyle/>
+            <a:p>
+              <a:pPr algn="ctr"/>
+              <a:endParaRPr lang="de-DE"/>
+            </a:p>
+          </p:txBody>
+        </p:sp>
+        <p:sp>
+          <p:nvSpPr>
+            <p:cNvPr id="82" name="Rechteck 81">
+              <a:extLst>
+                <a:ext uri="{FF2B5EF4-FFF2-40B4-BE49-F238E27FC236}">
+                  <a16:creationId xmlns:a16="http://schemas.microsoft.com/office/drawing/2014/main" id="{F351E06F-A96D-D7A8-F247-A7130832B479}"/>
+                </a:ext>
+              </a:extLst>
+            </p:cNvPr>
+            <p:cNvSpPr/>
+            <p:nvPr/>
+          </p:nvSpPr>
+          <p:spPr>
+            <a:xfrm>
+              <a:off x="9756684" y="3400544"/>
+              <a:ext cx="245426" cy="686456"/>
+            </a:xfrm>
+            <a:prstGeom prst="rect">
+              <a:avLst/>
+            </a:prstGeom>
+            <a:solidFill>
+              <a:schemeClr val="bg2">
+                <a:lumMod val="75000"/>
+              </a:schemeClr>
+            </a:solidFill>
+            <a:scene3d>
+              <a:camera prst="isometricRightUp"/>
+              <a:lightRig rig="threePt" dir="t"/>
+            </a:scene3d>
+          </p:spPr>
+          <p:style>
+            <a:lnRef idx="2">
+              <a:schemeClr val="accent1">
+                <a:shade val="15000"/>
+              </a:schemeClr>
+            </a:lnRef>
+            <a:fillRef idx="1">
+              <a:schemeClr val="accent1"/>
+            </a:fillRef>
+            <a:effectRef idx="0">
+              <a:schemeClr val="accent1"/>
+            </a:effectRef>
+            <a:fontRef idx="minor">
+              <a:schemeClr val="lt1"/>
+            </a:fontRef>
+          </p:style>
+          <p:txBody>
+            <a:bodyPr rtlCol="0" anchor="ctr"/>
+            <a:lstStyle/>
+            <a:p>
+              <a:pPr algn="ctr"/>
+              <a:endParaRPr lang="de-DE"/>
+            </a:p>
+          </p:txBody>
+        </p:sp>
+        <p:sp>
+          <p:nvSpPr>
+            <p:cNvPr id="83" name="Rechteck 82">
+              <a:extLst>
+                <a:ext uri="{FF2B5EF4-FFF2-40B4-BE49-F238E27FC236}">
+                  <a16:creationId xmlns:a16="http://schemas.microsoft.com/office/drawing/2014/main" id="{0B35EB49-F8FF-D9E8-886C-1BBC6F73E3D1}"/>
+                </a:ext>
+              </a:extLst>
+            </p:cNvPr>
+            <p:cNvSpPr/>
+            <p:nvPr/>
+          </p:nvSpPr>
+          <p:spPr>
+            <a:xfrm>
+              <a:off x="10081770" y="3585313"/>
+              <a:ext cx="245426" cy="686456"/>
+            </a:xfrm>
+            <a:prstGeom prst="rect">
+              <a:avLst/>
+            </a:prstGeom>
+            <a:solidFill>
+              <a:schemeClr val="bg2">
+                <a:lumMod val="75000"/>
+              </a:schemeClr>
+            </a:solidFill>
+            <a:scene3d>
+              <a:camera prst="isometricRightUp"/>
+              <a:lightRig rig="threePt" dir="t"/>
+            </a:scene3d>
+          </p:spPr>
+          <p:style>
+            <a:lnRef idx="2">
+              <a:schemeClr val="accent1">
+                <a:shade val="15000"/>
+              </a:schemeClr>
+            </a:lnRef>
+            <a:fillRef idx="1">
+              <a:schemeClr val="accent1"/>
+            </a:fillRef>
+            <a:effectRef idx="0">
+              <a:schemeClr val="accent1"/>
+            </a:effectRef>
+            <a:fontRef idx="minor">
+              <a:schemeClr val="lt1"/>
+            </a:fontRef>
+          </p:style>
+          <p:txBody>
+            <a:bodyPr rtlCol="0" anchor="ctr"/>
+            <a:lstStyle/>
+            <a:p>
+              <a:pPr algn="ctr"/>
+              <a:endParaRPr lang="de-DE"/>
+            </a:p>
+          </p:txBody>
+        </p:sp>
+        <p:sp>
+          <p:nvSpPr>
+            <p:cNvPr id="84" name="Freihandform: Form 83">
+              <a:extLst>
+                <a:ext uri="{FF2B5EF4-FFF2-40B4-BE49-F238E27FC236}">
+                  <a16:creationId xmlns:a16="http://schemas.microsoft.com/office/drawing/2014/main" id="{7373AE7A-0812-8FD6-23CE-2C3639EFEFED}"/>
+                </a:ext>
+              </a:extLst>
+            </p:cNvPr>
+            <p:cNvSpPr/>
+            <p:nvPr/>
+          </p:nvSpPr>
+          <p:spPr>
+            <a:xfrm rot="3428075">
+              <a:off x="8850766" y="4447731"/>
+              <a:ext cx="434443" cy="609703"/>
+            </a:xfrm>
+            <a:custGeom>
+              <a:avLst/>
+              <a:gdLst>
+                <a:gd name="connsiteX0" fmla="*/ 0 w 609600"/>
+                <a:gd name="connsiteY0" fmla="*/ 384314 h 569844"/>
+                <a:gd name="connsiteX1" fmla="*/ 313634 w 609600"/>
+                <a:gd name="connsiteY1" fmla="*/ 569844 h 569844"/>
+                <a:gd name="connsiteX2" fmla="*/ 609600 w 609600"/>
+                <a:gd name="connsiteY2" fmla="*/ 176696 h 569844"/>
+                <a:gd name="connsiteX3" fmla="*/ 269460 w 609600"/>
+                <a:gd name="connsiteY3" fmla="*/ 0 h 569844"/>
+                <a:gd name="connsiteX4" fmla="*/ 0 w 609600"/>
+                <a:gd name="connsiteY4" fmla="*/ 384314 h 569844"/>
+                <a:gd name="connsiteX0" fmla="*/ 0 w 582877"/>
+                <a:gd name="connsiteY0" fmla="*/ 384314 h 569844"/>
+                <a:gd name="connsiteX1" fmla="*/ 313634 w 582877"/>
+                <a:gd name="connsiteY1" fmla="*/ 569844 h 569844"/>
+                <a:gd name="connsiteX2" fmla="*/ 582877 w 582877"/>
+                <a:gd name="connsiteY2" fmla="*/ 205289 h 569844"/>
+                <a:gd name="connsiteX3" fmla="*/ 269460 w 582877"/>
+                <a:gd name="connsiteY3" fmla="*/ 0 h 569844"/>
+                <a:gd name="connsiteX4" fmla="*/ 0 w 582877"/>
+                <a:gd name="connsiteY4" fmla="*/ 384314 h 569844"/>
+                <a:gd name="connsiteX0" fmla="*/ 0 w 582877"/>
+                <a:gd name="connsiteY0" fmla="*/ 424949 h 610479"/>
+                <a:gd name="connsiteX1" fmla="*/ 313634 w 582877"/>
+                <a:gd name="connsiteY1" fmla="*/ 610479 h 610479"/>
+                <a:gd name="connsiteX2" fmla="*/ 582877 w 582877"/>
+                <a:gd name="connsiteY2" fmla="*/ 245924 h 610479"/>
+                <a:gd name="connsiteX3" fmla="*/ 148826 w 582877"/>
+                <a:gd name="connsiteY3" fmla="*/ 0 h 610479"/>
+                <a:gd name="connsiteX4" fmla="*/ 0 w 582877"/>
+                <a:gd name="connsiteY4" fmla="*/ 424949 h 610479"/>
+                <a:gd name="connsiteX0" fmla="*/ 0 w 446337"/>
+                <a:gd name="connsiteY0" fmla="*/ 424949 h 610479"/>
+                <a:gd name="connsiteX1" fmla="*/ 313634 w 446337"/>
+                <a:gd name="connsiteY1" fmla="*/ 610479 h 610479"/>
+                <a:gd name="connsiteX2" fmla="*/ 446337 w 446337"/>
+                <a:gd name="connsiteY2" fmla="*/ 190228 h 610479"/>
+                <a:gd name="connsiteX3" fmla="*/ 148826 w 446337"/>
+                <a:gd name="connsiteY3" fmla="*/ 0 h 610479"/>
+                <a:gd name="connsiteX4" fmla="*/ 0 w 446337"/>
+                <a:gd name="connsiteY4" fmla="*/ 424949 h 610479"/>
+              </a:gdLst>
+              <a:ahLst/>
+              <a:cxnLst>
+                <a:cxn ang="0">
+                  <a:pos x="connsiteX0" y="connsiteY0"/>
+                </a:cxn>
+                <a:cxn ang="0">
+                  <a:pos x="connsiteX1" y="connsiteY1"/>
+                </a:cxn>
+                <a:cxn ang="0">
+                  <a:pos x="connsiteX2" y="connsiteY2"/>
+                </a:cxn>
+                <a:cxn ang="0">
+                  <a:pos x="connsiteX3" y="connsiteY3"/>
+                </a:cxn>
+                <a:cxn ang="0">
+                  <a:pos x="connsiteX4" y="connsiteY4"/>
+                </a:cxn>
+              </a:cxnLst>
+              <a:rect l="l" t="t" r="r" b="b"/>
+              <a:pathLst>
+                <a:path w="446337" h="610479">
+                  <a:moveTo>
+                    <a:pt x="0" y="424949"/>
+                  </a:moveTo>
+                  <a:lnTo>
+                    <a:pt x="313634" y="610479"/>
+                  </a:lnTo>
+                  <a:lnTo>
+                    <a:pt x="446337" y="190228"/>
+                  </a:lnTo>
+                  <a:lnTo>
+                    <a:pt x="148826" y="0"/>
+                  </a:lnTo>
+                  <a:lnTo>
+                    <a:pt x="0" y="424949"/>
+                  </a:lnTo>
+                  <a:close/>
+                </a:path>
+              </a:pathLst>
+            </a:custGeom>
+            <a:solidFill>
+              <a:schemeClr val="bg1">
+                <a:lumMod val="75000"/>
+              </a:schemeClr>
+            </a:solidFill>
+          </p:spPr>
+          <p:style>
+            <a:lnRef idx="2">
+              <a:schemeClr val="accent1">
+                <a:shade val="15000"/>
+              </a:schemeClr>
+            </a:lnRef>
+            <a:fillRef idx="1">
+              <a:schemeClr val="accent1"/>
+            </a:fillRef>
+            <a:effectRef idx="0">
+              <a:schemeClr val="accent1"/>
+            </a:effectRef>
+            <a:fontRef idx="minor">
+              <a:schemeClr val="lt1"/>
+            </a:fontRef>
+          </p:style>
+          <p:txBody>
+            <a:bodyPr rtlCol="0" anchor="ctr"/>
+            <a:lstStyle/>
+            <a:p>
+              <a:pPr algn="ctr"/>
+              <a:endParaRPr lang="de-DE"/>
+            </a:p>
+          </p:txBody>
+        </p:sp>
+        <p:cxnSp>
+          <p:nvCxnSpPr>
+            <p:cNvPr id="85" name="Gerade Verbindung mit Pfeil 84">
+              <a:extLst>
+                <a:ext uri="{FF2B5EF4-FFF2-40B4-BE49-F238E27FC236}">
+                  <a16:creationId xmlns:a16="http://schemas.microsoft.com/office/drawing/2014/main" id="{4C4F931E-BD09-1180-9B03-3A5B7FFB3020}"/>
+                </a:ext>
+              </a:extLst>
+            </p:cNvPr>
+            <p:cNvCxnSpPr>
+              <a:cxnSpLocks/>
+            </p:cNvCxnSpPr>
+            <p:nvPr/>
+          </p:nvCxnSpPr>
+          <p:spPr>
+            <a:xfrm flipH="1" flipV="1">
+              <a:off x="9295447" y="4799453"/>
+              <a:ext cx="292958" cy="13442"/>
+            </a:xfrm>
+            <a:prstGeom prst="straightConnector1">
+              <a:avLst/>
+            </a:prstGeom>
+            <a:ln>
+              <a:solidFill>
+                <a:schemeClr val="tx1"/>
+              </a:solidFill>
+              <a:tailEnd type="arrow" w="sm" len="med"/>
+            </a:ln>
+          </p:spPr>
+          <p:style>
+            <a:lnRef idx="1">
+              <a:schemeClr val="accent1"/>
+            </a:lnRef>
+            <a:fillRef idx="0">
+              <a:schemeClr val="accent1"/>
+            </a:fillRef>
+            <a:effectRef idx="0">
+              <a:schemeClr val="accent1"/>
+            </a:effectRef>
+            <a:fontRef idx="minor">
+              <a:schemeClr val="tx1"/>
+            </a:fontRef>
+          </p:style>
+        </p:cxnSp>
+        <p:sp>
+          <p:nvSpPr>
+            <p:cNvPr id="92" name="Textfeld 91">
+              <a:extLst>
+                <a:ext uri="{FF2B5EF4-FFF2-40B4-BE49-F238E27FC236}">
+                  <a16:creationId xmlns:a16="http://schemas.microsoft.com/office/drawing/2014/main" id="{1F42FB4D-B04D-6479-6EA9-0259E8BE01A3}"/>
+                </a:ext>
+              </a:extLst>
+            </p:cNvPr>
+            <p:cNvSpPr txBox="1"/>
+            <p:nvPr/>
+          </p:nvSpPr>
+          <p:spPr>
+            <a:xfrm>
+              <a:off x="9517238" y="4719599"/>
+              <a:ext cx="824265" cy="215444"/>
+            </a:xfrm>
+            <a:prstGeom prst="rect">
+              <a:avLst/>
+            </a:prstGeom>
+            <a:noFill/>
+          </p:spPr>
+          <p:txBody>
+            <a:bodyPr wrap="none" rtlCol="0">
+              <a:spAutoFit/>
+            </a:bodyPr>
+            <a:lstStyle/>
+            <a:p>
+              <a:r>
+                <a:rPr lang="de-DE" sz="800" dirty="0" err="1"/>
+                <a:t>PrimaryLocking</a:t>
+              </a:r>
+              <a:endParaRPr lang="de-DE" sz="800" dirty="0"/>
+            </a:p>
+          </p:txBody>
+        </p:sp>
+        <p:cxnSp>
+          <p:nvCxnSpPr>
+            <p:cNvPr id="95" name="Gerade Verbindung mit Pfeil 94">
+              <a:extLst>
+                <a:ext uri="{FF2B5EF4-FFF2-40B4-BE49-F238E27FC236}">
+                  <a16:creationId xmlns:a16="http://schemas.microsoft.com/office/drawing/2014/main" id="{B26B0EFA-1CF4-A03D-7339-9B3E943AB4B2}"/>
+                </a:ext>
+              </a:extLst>
+            </p:cNvPr>
+            <p:cNvCxnSpPr>
+              <a:cxnSpLocks/>
+            </p:cNvCxnSpPr>
+            <p:nvPr/>
+          </p:nvCxnSpPr>
+          <p:spPr>
+            <a:xfrm flipV="1">
+              <a:off x="8209352" y="3383452"/>
+              <a:ext cx="2958462" cy="1609002"/>
+            </a:xfrm>
+            <a:prstGeom prst="straightConnector1">
+              <a:avLst/>
+            </a:prstGeom>
+            <a:ln w="28575">
+              <a:solidFill>
+                <a:schemeClr val="accent2"/>
+              </a:solidFill>
+              <a:tailEnd type="triangle" w="med" len="med"/>
+            </a:ln>
+          </p:spPr>
+          <p:style>
+            <a:lnRef idx="1">
+              <a:schemeClr val="accent2"/>
+            </a:lnRef>
+            <a:fillRef idx="0">
+              <a:schemeClr val="accent2"/>
+            </a:fillRef>
+            <a:effectRef idx="0">
+              <a:schemeClr val="accent2"/>
+            </a:effectRef>
+            <a:fontRef idx="minor">
+              <a:schemeClr val="tx1"/>
+            </a:fontRef>
+          </p:style>
+        </p:cxnSp>
+        <p:sp>
+          <p:nvSpPr>
+            <p:cNvPr id="96" name="Textfeld 95">
+              <a:extLst>
+                <a:ext uri="{FF2B5EF4-FFF2-40B4-BE49-F238E27FC236}">
+                  <a16:creationId xmlns:a16="http://schemas.microsoft.com/office/drawing/2014/main" id="{66716BF8-33C4-355E-86B5-4136C2DCBACF}"/>
+                </a:ext>
+              </a:extLst>
+            </p:cNvPr>
+            <p:cNvSpPr txBox="1"/>
+            <p:nvPr/>
+          </p:nvSpPr>
+          <p:spPr>
+            <a:xfrm>
+              <a:off x="11133776" y="3152199"/>
+              <a:ext cx="292068" cy="369332"/>
+            </a:xfrm>
+            <a:prstGeom prst="rect">
+              <a:avLst/>
+            </a:prstGeom>
+            <a:noFill/>
+          </p:spPr>
+          <p:txBody>
+            <a:bodyPr wrap="none" rtlCol="0">
+              <a:spAutoFit/>
+            </a:bodyPr>
+            <a:lstStyle/>
+            <a:p>
+              <a:r>
+                <a:rPr lang="de-DE" dirty="0">
+                  <a:solidFill>
+                    <a:schemeClr val="accent2"/>
+                  </a:solidFill>
+                </a:rPr>
+                <a:t>Z</a:t>
+              </a:r>
+            </a:p>
+          </p:txBody>
+        </p:sp>
+        <p:sp>
+          <p:nvSpPr>
+            <p:cNvPr id="97" name="Textfeld 96">
+              <a:extLst>
+                <a:ext uri="{FF2B5EF4-FFF2-40B4-BE49-F238E27FC236}">
+                  <a16:creationId xmlns:a16="http://schemas.microsoft.com/office/drawing/2014/main" id="{692AA561-35C5-32F2-53F9-4059CD890474}"/>
+                </a:ext>
+              </a:extLst>
+            </p:cNvPr>
+            <p:cNvSpPr txBox="1"/>
+            <p:nvPr/>
+          </p:nvSpPr>
+          <p:spPr>
+            <a:xfrm>
+              <a:off x="8060913" y="3373987"/>
+              <a:ext cx="304892" cy="369332"/>
+            </a:xfrm>
+            <a:prstGeom prst="rect">
+              <a:avLst/>
+            </a:prstGeom>
+            <a:noFill/>
+          </p:spPr>
+          <p:txBody>
+            <a:bodyPr wrap="none" rtlCol="0">
+              <a:spAutoFit/>
+            </a:bodyPr>
+            <a:lstStyle/>
+            <a:p>
+              <a:r>
+                <a:rPr lang="de-DE" dirty="0">
+                  <a:solidFill>
+                    <a:schemeClr val="accent1"/>
+                  </a:solidFill>
+                </a:rPr>
+                <a:t>X</a:t>
+              </a:r>
+            </a:p>
+          </p:txBody>
+        </p:sp>
+        <p:cxnSp>
+          <p:nvCxnSpPr>
+            <p:cNvPr id="98" name="Gerade Verbindung mit Pfeil 97">
+              <a:extLst>
+                <a:ext uri="{FF2B5EF4-FFF2-40B4-BE49-F238E27FC236}">
+                  <a16:creationId xmlns:a16="http://schemas.microsoft.com/office/drawing/2014/main" id="{17581CFB-6345-079B-C542-643E9E80F8AF}"/>
+                </a:ext>
+              </a:extLst>
+            </p:cNvPr>
+            <p:cNvCxnSpPr>
+              <a:cxnSpLocks/>
+            </p:cNvCxnSpPr>
+            <p:nvPr/>
+          </p:nvCxnSpPr>
+          <p:spPr>
+            <a:xfrm flipV="1">
+              <a:off x="8209352" y="3684112"/>
+              <a:ext cx="0" cy="1301481"/>
+            </a:xfrm>
+            <a:prstGeom prst="straightConnector1">
+              <a:avLst/>
+            </a:prstGeom>
+            <a:ln w="28575">
+              <a:solidFill>
+                <a:schemeClr val="accent1"/>
+              </a:solidFill>
+              <a:tailEnd type="triangle" w="med" len="med"/>
+            </a:ln>
+          </p:spPr>
+          <p:style>
+            <a:lnRef idx="1">
+              <a:schemeClr val="accent2"/>
+            </a:lnRef>
+            <a:fillRef idx="0">
+              <a:schemeClr val="accent2"/>
+            </a:fillRef>
+            <a:effectRef idx="0">
+              <a:schemeClr val="accent2"/>
+            </a:effectRef>
+            <a:fontRef idx="minor">
+              <a:schemeClr val="tx1"/>
+            </a:fontRef>
+          </p:style>
+        </p:cxnSp>
+        <p:cxnSp>
+          <p:nvCxnSpPr>
+            <p:cNvPr id="99" name="Gerade Verbindung mit Pfeil 98">
+              <a:extLst>
+                <a:ext uri="{FF2B5EF4-FFF2-40B4-BE49-F238E27FC236}">
+                  <a16:creationId xmlns:a16="http://schemas.microsoft.com/office/drawing/2014/main" id="{BCF7DD3D-1EEF-5A34-8B4C-006B638E9B4F}"/>
+                </a:ext>
+              </a:extLst>
+            </p:cNvPr>
+            <p:cNvCxnSpPr>
+              <a:cxnSpLocks/>
+            </p:cNvCxnSpPr>
+            <p:nvPr/>
+          </p:nvCxnSpPr>
+          <p:spPr>
+            <a:xfrm>
+              <a:off x="8212039" y="4992454"/>
+              <a:ext cx="822343" cy="465900"/>
+            </a:xfrm>
+            <a:prstGeom prst="straightConnector1">
+              <a:avLst/>
+            </a:prstGeom>
+            <a:ln w="28575">
+              <a:solidFill>
+                <a:schemeClr val="accent6"/>
+              </a:solidFill>
+              <a:tailEnd type="triangle" w="med" len="med"/>
+            </a:ln>
+          </p:spPr>
+          <p:style>
+            <a:lnRef idx="1">
+              <a:schemeClr val="accent2"/>
+            </a:lnRef>
+            <a:fillRef idx="0">
+              <a:schemeClr val="accent2"/>
+            </a:fillRef>
+            <a:effectRef idx="0">
+              <a:schemeClr val="accent2"/>
+            </a:effectRef>
+            <a:fontRef idx="minor">
+              <a:schemeClr val="tx1"/>
+            </a:fontRef>
+          </p:style>
+        </p:cxnSp>
+        <p:sp>
+          <p:nvSpPr>
+            <p:cNvPr id="100" name="Textfeld 99">
+              <a:extLst>
+                <a:ext uri="{FF2B5EF4-FFF2-40B4-BE49-F238E27FC236}">
+                  <a16:creationId xmlns:a16="http://schemas.microsoft.com/office/drawing/2014/main" id="{E8D1C652-5C51-2CC5-84E5-9AB841745BF6}"/>
+                </a:ext>
+              </a:extLst>
+            </p:cNvPr>
+            <p:cNvSpPr txBox="1"/>
+            <p:nvPr/>
+          </p:nvSpPr>
+          <p:spPr>
+            <a:xfrm>
+              <a:off x="8984320" y="5196744"/>
+              <a:ext cx="296876" cy="369332"/>
+            </a:xfrm>
+            <a:prstGeom prst="rect">
+              <a:avLst/>
+            </a:prstGeom>
+            <a:noFill/>
+            <a:ln>
+              <a:noFill/>
+            </a:ln>
+          </p:spPr>
+          <p:txBody>
+            <a:bodyPr wrap="none" rtlCol="0">
+              <a:spAutoFit/>
+            </a:bodyPr>
+            <a:lstStyle/>
+            <a:p>
+              <a:r>
+                <a:rPr lang="de-DE" dirty="0">
+                  <a:solidFill>
+                    <a:schemeClr val="accent6"/>
+                  </a:solidFill>
+                </a:rPr>
+                <a:t>Y</a:t>
+              </a:r>
+            </a:p>
+          </p:txBody>
+        </p:sp>
+        <p:grpSp>
+          <p:nvGrpSpPr>
+            <p:cNvPr id="101" name="Gruppieren 100">
+              <a:extLst>
+                <a:ext uri="{FF2B5EF4-FFF2-40B4-BE49-F238E27FC236}">
+                  <a16:creationId xmlns:a16="http://schemas.microsoft.com/office/drawing/2014/main" id="{EA889759-407A-FFEA-F82B-F4D424F9D297}"/>
+                </a:ext>
+              </a:extLst>
+            </p:cNvPr>
+            <p:cNvGrpSpPr/>
+            <p:nvPr/>
+          </p:nvGrpSpPr>
+          <p:grpSpPr>
+            <a:xfrm>
+              <a:off x="8176633" y="4955891"/>
+              <a:ext cx="72000" cy="73126"/>
+              <a:chOff x="1489075" y="2578663"/>
+              <a:chExt cx="72000" cy="73126"/>
+            </a:xfrm>
+            <a:scene3d>
+              <a:camera prst="isometricLeftDown"/>
+              <a:lightRig rig="threePt" dir="t"/>
+            </a:scene3d>
+          </p:grpSpPr>
+          <p:cxnSp>
+            <p:nvCxnSpPr>
+              <p:cNvPr id="102" name="Gerader Verbinder 101">
+                <a:extLst>
+                  <a:ext uri="{FF2B5EF4-FFF2-40B4-BE49-F238E27FC236}">
+                    <a16:creationId xmlns:a16="http://schemas.microsoft.com/office/drawing/2014/main" id="{801404FF-0F78-9209-C5DA-2C4F291E5244}"/>
+                  </a:ext>
+                </a:extLst>
+              </p:cNvPr>
+              <p:cNvCxnSpPr>
+                <a:cxnSpLocks/>
+              </p:cNvCxnSpPr>
+              <p:nvPr/>
+            </p:nvCxnSpPr>
+            <p:spPr>
+              <a:xfrm>
+                <a:off x="1489075" y="2579789"/>
+                <a:ext cx="72000" cy="72000"/>
+              </a:xfrm>
+              <a:prstGeom prst="line">
+                <a:avLst/>
+              </a:prstGeom>
+              <a:ln w="19050">
+                <a:solidFill>
+                  <a:srgbClr val="FF0000"/>
+                </a:solidFill>
+              </a:ln>
+            </p:spPr>
+            <p:style>
+              <a:lnRef idx="1">
+                <a:schemeClr val="accent1"/>
+              </a:lnRef>
+              <a:fillRef idx="0">
+                <a:schemeClr val="accent1"/>
+              </a:fillRef>
+              <a:effectRef idx="0">
+                <a:schemeClr val="accent1"/>
+              </a:effectRef>
+              <a:fontRef idx="minor">
+                <a:schemeClr val="tx1"/>
+              </a:fontRef>
+            </p:style>
+          </p:cxnSp>
+          <p:cxnSp>
+            <p:nvCxnSpPr>
+              <p:cNvPr id="103" name="Gerader Verbinder 102">
+                <a:extLst>
+                  <a:ext uri="{FF2B5EF4-FFF2-40B4-BE49-F238E27FC236}">
+                    <a16:creationId xmlns:a16="http://schemas.microsoft.com/office/drawing/2014/main" id="{51C341BA-9206-74A9-7689-50CA1BD1FBB9}"/>
+                  </a:ext>
+                </a:extLst>
+              </p:cNvPr>
+              <p:cNvCxnSpPr>
+                <a:cxnSpLocks/>
+              </p:cNvCxnSpPr>
+              <p:nvPr/>
+            </p:nvCxnSpPr>
+            <p:spPr>
+              <a:xfrm flipV="1">
+                <a:off x="1489075" y="2578663"/>
+                <a:ext cx="72000" cy="73126"/>
+              </a:xfrm>
+              <a:prstGeom prst="line">
+                <a:avLst/>
+              </a:prstGeom>
+              <a:ln w="19050">
+                <a:solidFill>
+                  <a:srgbClr val="FF0000"/>
+                </a:solidFill>
+              </a:ln>
+            </p:spPr>
+            <p:style>
+              <a:lnRef idx="1">
+                <a:schemeClr val="accent1"/>
+              </a:lnRef>
+              <a:fillRef idx="0">
+                <a:schemeClr val="accent1"/>
+              </a:fillRef>
+              <a:effectRef idx="0">
+                <a:schemeClr val="accent1"/>
+              </a:effectRef>
+              <a:fontRef idx="minor">
+                <a:schemeClr val="tx1"/>
+              </a:fontRef>
+            </p:style>
+          </p:cxnSp>
+        </p:grpSp>
+        <p:sp>
+          <p:nvSpPr>
+            <p:cNvPr id="104" name="Textfeld 103">
+              <a:extLst>
+                <a:ext uri="{FF2B5EF4-FFF2-40B4-BE49-F238E27FC236}">
+                  <a16:creationId xmlns:a16="http://schemas.microsoft.com/office/drawing/2014/main" id="{A6398DE1-6C0A-BD87-BA2E-5701F2802AB2}"/>
+                </a:ext>
+              </a:extLst>
+            </p:cNvPr>
+            <p:cNvSpPr txBox="1"/>
+            <p:nvPr/>
+          </p:nvSpPr>
+          <p:spPr>
+            <a:xfrm>
+              <a:off x="7973737" y="5458354"/>
+              <a:ext cx="1470274" cy="215444"/>
+            </a:xfrm>
+            <a:prstGeom prst="rect">
+              <a:avLst/>
+            </a:prstGeom>
+            <a:noFill/>
+          </p:spPr>
+          <p:txBody>
+            <a:bodyPr wrap="none" rtlCol="0">
+              <a:spAutoFit/>
+            </a:bodyPr>
+            <a:lstStyle/>
+            <a:p>
+              <a:r>
+                <a:rPr lang="de-DE" sz="800" i="1" u="sng" dirty="0" err="1"/>
+                <a:t>WireReception.Rotation</a:t>
+              </a:r>
+              <a:r>
+                <a:rPr lang="de-DE" sz="800" i="1" u="sng" dirty="0"/>
+                <a:t> = 270°</a:t>
+              </a:r>
+            </a:p>
+          </p:txBody>
+        </p:sp>
+      </p:grpSp>
+    </p:spTree>
+    <p:extLst>
+      <p:ext uri="{BB962C8B-B14F-4D97-AF65-F5344CB8AC3E}">
+        <p14:creationId xmlns:p14="http://schemas.microsoft.com/office/powerpoint/2010/main" val="3035325780"/>
+      </p:ext>
+    </p:extLst>
+  </p:cSld>
+  <p:clrMapOvr>
+    <a:masterClrMapping/>
+  </p:clrMapOvr>
+</p:sld>
+</file>
+
 <file path=ppt/theme/theme1.xml><?xml version="1.0" encoding="utf-8"?>
 <a:theme xmlns:a="http://schemas.openxmlformats.org/drawingml/2006/main" name="Office">
   <a:themeElements>

</xml_diff>